<commit_message>
fixed mistakes in presentation
</commit_message>
<xml_diff>
--- a/doc/presentatie oktober.pptx
+++ b/doc/presentatie oktober.pptx
@@ -4514,7 +4514,7 @@
                 <a:spcPct val="100000"/>
               </a:lnSpc>
             </a:pPr>
-            <a:fld id="{A5C469FC-F7B5-4D0D-BFF1-DAA1E8CF27E3}" type="datetime">
+            <a:fld id="{60250649-DC82-4215-A142-035E47C2C6C7}" type="datetime">
               <a:rPr b="0" lang="en-US" sz="1200" spc="-1" strike="noStrike">
                 <a:solidFill>
                   <a:srgbClr val="b07906"/>
@@ -4584,7 +4584,7 @@
                 <a:spcPct val="100000"/>
               </a:lnSpc>
             </a:pPr>
-            <a:fld id="{A49DFF27-F8DE-440F-BAC8-9489ABC9348C}" type="slidenum">
+            <a:fld id="{B1581BEA-CFB8-48E0-8C30-1C57F8162C83}" type="slidenum">
               <a:rPr b="0" lang="en-US" sz="1200" spc="-1" strike="noStrike">
                 <a:solidFill>
                   <a:srgbClr val="b07906"/>
@@ -5646,7 +5646,7 @@
                 <a:spcPct val="100000"/>
               </a:lnSpc>
             </a:pPr>
-            <a:fld id="{CC828FC1-3C18-40C0-A6A8-B70FE32E17EB}" type="datetime">
+            <a:fld id="{491A47D7-1CD8-4811-8E57-C009C1CD3F66}" type="datetime">
               <a:rPr b="0" lang="en-US" sz="1200" spc="-1" strike="noStrike">
                 <a:solidFill>
                   <a:srgbClr val="595959"/>
@@ -5716,14 +5716,14 @@
                 <a:spcPct val="100000"/>
               </a:lnSpc>
             </a:pPr>
-            <a:fld id="{87AEDC0C-CD60-4DD0-95CF-E0DB045AF4CF}" type="slidenum">
+            <a:fld id="{D26BF323-1A75-4409-8763-92BC2F1EE1BA}" type="slidenum">
               <a:rPr b="0" lang="en-US" sz="1200" spc="-1" strike="noStrike">
                 <a:solidFill>
                   <a:srgbClr val="595959"/>
                 </a:solidFill>
                 <a:latin typeface="Gill Sans MT"/>
               </a:rPr>
-              <a:t>&lt;number&gt;</a:t>
+              <a:t>1</a:t>
             </a:fld>
             <a:endParaRPr b="0" lang="en-US" sz="1200" spc="-1" strike="noStrike">
               <a:latin typeface="Times New Roman"/>

</xml_diff>